<commit_message>
just fixed the repo link
</commit_message>
<xml_diff>
--- a/Final PPT.pptx
+++ b/Final PPT.pptx
@@ -268,7 +268,7 @@
       <p15:sldGuideLst xmlns:p15="http://schemas.microsoft.com/office/powerpoint/2012/main"/>
     </p:ext>
     <p:ext uri="GoogleSlidesCustomDataVersion2">
-      <go:slidesCustomData xmlns:mc="http://schemas.openxmlformats.org/markup-compatibility/2006" xmlns:mv="urn:schemas-microsoft-com:mac:vml" xmlns:c="http://schemas.openxmlformats.org/drawingml/2006/chart" xmlns:dgm="http://schemas.openxmlformats.org/drawingml/2006/diagram" xmlns:o="urn:schemas-microsoft-com:office:office" xmlns:v="urn:schemas-microsoft-com:vml" xmlns:pvml="urn:schemas-microsoft-com:office:powerpoint" xmlns:com="http://schemas.openxmlformats.org/drawingml/2006/compatibility" xmlns:p14="http://schemas.microsoft.com/office/powerpoint/2010/main" xmlns:p15="http://schemas.microsoft.com/office/powerpoint/2012/main" xmlns:ahyp="http://schemas.microsoft.com/office/drawing/2018/hyperlinkcolor" xmlns:go="http://customooxmlschemas.google.com/" xmlns="" r:id="rId20" roundtripDataSignature="AMtx7mirVFXO0Y+gBcjyG77OGRY+W3dAtQ=="/>
+      <go:slidesCustomData xmlns="" xmlns:go="http://customooxmlschemas.google.com/" xmlns:ahyp="http://schemas.microsoft.com/office/drawing/2018/hyperlinkcolor" xmlns:p15="http://schemas.microsoft.com/office/powerpoint/2012/main" xmlns:p14="http://schemas.microsoft.com/office/powerpoint/2010/main" xmlns:com="http://schemas.openxmlformats.org/drawingml/2006/compatibility" xmlns:pvml="urn:schemas-microsoft-com:office:powerpoint" xmlns:v="urn:schemas-microsoft-com:vml" xmlns:o="urn:schemas-microsoft-com:office:office" xmlns:dgm="http://schemas.openxmlformats.org/drawingml/2006/diagram" xmlns:c="http://schemas.openxmlformats.org/drawingml/2006/chart" xmlns:mv="urn:schemas-microsoft-com:mac:vml" xmlns:mc="http://schemas.openxmlformats.org/markup-compatibility/2006" r:id="rId20" roundtripDataSignature="AMtx7mirVFXO0Y+gBcjyG77OGRY+W3dAtQ=="/>
     </p:ext>
   </p:extLst>
 </p:presentation>
@@ -10306,11 +10306,11 @@
             </a:r>
             <a:r>
               <a:rPr lang="en-GB" sz="1500" dirty="0"/>
-              <a:t>: </a:t>
+              <a:t>:</a:t>
             </a:r>
             <a:r>
               <a:rPr lang="en-GB" sz="900" dirty="0"/>
-              <a:t>https://github.com/HackOverFlow-HackWithIndia/Safety-Object-Detection---multiclass-detection-7-classes-for-operational-safety.</a:t>
+              <a:t> https://github.com/HackOverFlow-HackWithIndia/Safety-Object-Detection---multiclass-detection-7-classes-for-operational-safety</a:t>
             </a:r>
             <a:endParaRPr sz="900" i="0" u="none" strike="noStrike" cap="none" dirty="0">
               <a:solidFill>

</xml_diff>